<commit_message>
Ejercicio y Slides "Web Testing"
</commit_message>
<xml_diff>
--- a/Diapositivas/2. Test Doubles.pptx
+++ b/Diapositivas/2. Test Doubles.pptx
@@ -5,7 +5,7 @@
     <p:sldMasterId id="2147483684" r:id="rId1"/>
   </p:sldMasterIdLst>
   <p:notesMasterIdLst>
-    <p:notesMasterId r:id="rId40"/>
+    <p:notesMasterId r:id="rId41"/>
   </p:notesMasterIdLst>
   <p:sldIdLst>
     <p:sldId id="684" r:id="rId2"/>
@@ -46,6 +46,7 @@
     <p:sldId id="688" r:id="rId37"/>
     <p:sldId id="627" r:id="rId38"/>
     <p:sldId id="586" r:id="rId39"/>
+    <p:sldId id="689" r:id="rId40"/>
   </p:sldIdLst>
   <p:sldSz cx="9144000" cy="6858000" type="screen4x3"/>
   <p:notesSz cx="6858000" cy="9144000"/>
@@ -150,7 +151,7 @@
 
 <file path=ppt/commentAuthors.xml><?xml version="1.0" encoding="utf-8"?>
 <p:cmAuthorLst xmlns:a="http://schemas.openxmlformats.org/drawingml/2006/main" xmlns:r="http://schemas.openxmlformats.org/officeDocument/2006/relationships" xmlns:p="http://schemas.openxmlformats.org/presentationml/2006/main">
-  <p:cmAuthor id="0" name="Snahider" initials="S" lastIdx="20" clrIdx="0"/>
+  <p:cmAuthor id="0" name="Snahider" initials="S" lastIdx="21" clrIdx="0"/>
 </p:cmAuthorLst>
 </file>
 
@@ -166,6 +167,15 @@
 <file path=ppt/comments/comment2.xml><?xml version="1.0" encoding="utf-8"?>
 <p:cmLst xmlns:a="http://schemas.openxmlformats.org/drawingml/2006/main" xmlns:r="http://schemas.openxmlformats.org/officeDocument/2006/relationships" xmlns:p="http://schemas.openxmlformats.org/presentationml/2006/main">
   <p:cm authorId="0" dt="2012-08-22T17:59:56.774" idx="9">
+    <p:pos x="10" y="10"/>
+    <p:text> Organizar mejor esta diapositiva</p:text>
+  </p:cm>
+</p:cmLst>
+</file>
+
+<file path=ppt/comments/comment3.xml><?xml version="1.0" encoding="utf-8"?>
+<p:cmLst xmlns:a="http://schemas.openxmlformats.org/drawingml/2006/main" xmlns:r="http://schemas.openxmlformats.org/officeDocument/2006/relationships" xmlns:p="http://schemas.openxmlformats.org/presentationml/2006/main">
+  <p:cm authorId="0" dt="2012-08-22T17:59:56.774" idx="21">
     <p:pos x="10" y="10"/>
     <p:text> Organizar mejor esta diapositiva</p:text>
   </p:cm>
@@ -254,7 +264,7 @@
           <a:p>
             <a:fld id="{63D5FC4C-9EE1-4746-A368-724F618FC790}" type="datetimeFigureOut">
               <a:rPr lang="es-PE" smtClean="0"/>
-              <a:t>24/04/2013</a:t>
+              <a:t>26/04/2013</a:t>
             </a:fld>
             <a:endParaRPr lang="es-PE"/>
           </a:p>
@@ -6244,6 +6254,90 @@
 </p:notes>
 </file>
 
+<file path=ppt/notesSlides/notesSlide39.xml><?xml version="1.0" encoding="utf-8"?>
+<p:notes xmlns:a="http://schemas.openxmlformats.org/drawingml/2006/main" xmlns:r="http://schemas.openxmlformats.org/officeDocument/2006/relationships" xmlns:p="http://schemas.openxmlformats.org/presentationml/2006/main">
+  <p:cSld>
+    <p:spTree>
+      <p:nvGrpSpPr>
+        <p:cNvPr id="1" name=""/>
+        <p:cNvGrpSpPr/>
+        <p:nvPr/>
+      </p:nvGrpSpPr>
+      <p:grpSpPr>
+        <a:xfrm>
+          <a:off x="0" y="0"/>
+          <a:ext cx="0" cy="0"/>
+          <a:chOff x="0" y="0"/>
+          <a:chExt cx="0" cy="0"/>
+        </a:xfrm>
+      </p:grpSpPr>
+      <p:sp>
+        <p:nvSpPr>
+          <p:cNvPr id="2" name="1 Marcador de imagen de diapositiva"/>
+          <p:cNvSpPr>
+            <a:spLocks noGrp="1" noRot="1" noChangeAspect="1"/>
+          </p:cNvSpPr>
+          <p:nvPr>
+            <p:ph type="sldImg"/>
+          </p:nvPr>
+        </p:nvSpPr>
+        <p:spPr/>
+      </p:sp>
+      <p:sp>
+        <p:nvSpPr>
+          <p:cNvPr id="3" name="2 Marcador de notas"/>
+          <p:cNvSpPr>
+            <a:spLocks noGrp="1"/>
+          </p:cNvSpPr>
+          <p:nvPr>
+            <p:ph type="body" idx="1"/>
+          </p:nvPr>
+        </p:nvSpPr>
+        <p:spPr/>
+        <p:txBody>
+          <a:bodyPr/>
+          <a:lstStyle/>
+          <a:p>
+            <a:endParaRPr lang="es-PE" dirty="0"/>
+          </a:p>
+        </p:txBody>
+      </p:sp>
+      <p:sp>
+        <p:nvSpPr>
+          <p:cNvPr id="4" name="3 Marcador de número de diapositiva"/>
+          <p:cNvSpPr>
+            <a:spLocks noGrp="1"/>
+          </p:cNvSpPr>
+          <p:nvPr>
+            <p:ph type="sldNum" sz="quarter" idx="10"/>
+          </p:nvPr>
+        </p:nvSpPr>
+        <p:spPr/>
+        <p:txBody>
+          <a:bodyPr/>
+          <a:lstStyle/>
+          <a:p>
+            <a:fld id="{80C14895-23C8-45AE-85D5-3B35E5980A68}" type="slidenum">
+              <a:rPr lang="es-PE" smtClean="0"/>
+              <a:t>39</a:t>
+            </a:fld>
+            <a:endParaRPr lang="es-PE"/>
+          </a:p>
+        </p:txBody>
+      </p:sp>
+    </p:spTree>
+    <p:extLst>
+      <p:ext uri="{BB962C8B-B14F-4D97-AF65-F5344CB8AC3E}">
+        <p14:creationId xmlns:p14="http://schemas.microsoft.com/office/powerpoint/2010/main" val="3432092158"/>
+      </p:ext>
+    </p:extLst>
+  </p:cSld>
+  <p:clrMapOvr>
+    <a:masterClrMapping/>
+  </p:clrMapOvr>
+</p:notes>
+</file>
+
 <file path=ppt/notesSlides/notesSlide4.xml><?xml version="1.0" encoding="utf-8"?>
 <p:notes xmlns:a="http://schemas.openxmlformats.org/drawingml/2006/main" xmlns:r="http://schemas.openxmlformats.org/officeDocument/2006/relationships" xmlns:p="http://schemas.openxmlformats.org/presentationml/2006/main">
   <p:cSld>
@@ -7391,7 +7485,7 @@
             <a:fld id="{807CB568-C05F-482F-9F26-AA302B8892DF}" type="datetimeFigureOut">
               <a:rPr lang="es-ES" smtClean="0"/>
               <a:pPr/>
-              <a:t>24/04/2013</a:t>
+              <a:t>26/04/2013</a:t>
             </a:fld>
             <a:endParaRPr lang="es-ES"/>
           </a:p>
@@ -7570,7 +7664,7 @@
             <a:fld id="{807CB568-C05F-482F-9F26-AA302B8892DF}" type="datetimeFigureOut">
               <a:rPr lang="es-ES" smtClean="0"/>
               <a:pPr/>
-              <a:t>24/04/2013</a:t>
+              <a:t>26/04/2013</a:t>
             </a:fld>
             <a:endParaRPr lang="es-ES"/>
           </a:p>
@@ -7759,7 +7853,7 @@
             <a:fld id="{807CB568-C05F-482F-9F26-AA302B8892DF}" type="datetimeFigureOut">
               <a:rPr lang="es-ES" smtClean="0"/>
               <a:pPr/>
-              <a:t>24/04/2013</a:t>
+              <a:t>26/04/2013</a:t>
             </a:fld>
             <a:endParaRPr lang="es-ES"/>
           </a:p>
@@ -7938,7 +8032,7 @@
             <a:fld id="{807CB568-C05F-482F-9F26-AA302B8892DF}" type="datetimeFigureOut">
               <a:rPr lang="es-ES" smtClean="0"/>
               <a:pPr/>
-              <a:t>24/04/2013</a:t>
+              <a:t>26/04/2013</a:t>
             </a:fld>
             <a:endParaRPr lang="es-ES"/>
           </a:p>
@@ -8193,7 +8287,7 @@
             <a:fld id="{807CB568-C05F-482F-9F26-AA302B8892DF}" type="datetimeFigureOut">
               <a:rPr lang="es-ES" smtClean="0"/>
               <a:pPr/>
-              <a:t>24/04/2013</a:t>
+              <a:t>26/04/2013</a:t>
             </a:fld>
             <a:endParaRPr lang="es-ES"/>
           </a:p>
@@ -8490,7 +8584,7 @@
             <a:fld id="{807CB568-C05F-482F-9F26-AA302B8892DF}" type="datetimeFigureOut">
               <a:rPr lang="es-ES" smtClean="0"/>
               <a:pPr/>
-              <a:t>24/04/2013</a:t>
+              <a:t>26/04/2013</a:t>
             </a:fld>
             <a:endParaRPr lang="es-ES"/>
           </a:p>
@@ -8921,7 +9015,7 @@
             <a:fld id="{807CB568-C05F-482F-9F26-AA302B8892DF}" type="datetimeFigureOut">
               <a:rPr lang="es-ES" smtClean="0"/>
               <a:pPr/>
-              <a:t>24/04/2013</a:t>
+              <a:t>26/04/2013</a:t>
             </a:fld>
             <a:endParaRPr lang="es-ES"/>
           </a:p>
@@ -9048,7 +9142,7 @@
             <a:fld id="{807CB568-C05F-482F-9F26-AA302B8892DF}" type="datetimeFigureOut">
               <a:rPr lang="es-ES" smtClean="0"/>
               <a:pPr/>
-              <a:t>24/04/2013</a:t>
+              <a:t>26/04/2013</a:t>
             </a:fld>
             <a:endParaRPr lang="es-ES"/>
           </a:p>
@@ -9152,7 +9246,7 @@
             <a:fld id="{807CB568-C05F-482F-9F26-AA302B8892DF}" type="datetimeFigureOut">
               <a:rPr lang="es-ES" smtClean="0"/>
               <a:pPr/>
-              <a:t>24/04/2013</a:t>
+              <a:t>26/04/2013</a:t>
             </a:fld>
             <a:endParaRPr lang="es-ES"/>
           </a:p>
@@ -9438,7 +9532,7 @@
             <a:fld id="{807CB568-C05F-482F-9F26-AA302B8892DF}" type="datetimeFigureOut">
               <a:rPr lang="es-ES" smtClean="0"/>
               <a:pPr/>
-              <a:t>24/04/2013</a:t>
+              <a:t>26/04/2013</a:t>
             </a:fld>
             <a:endParaRPr lang="es-ES"/>
           </a:p>
@@ -9707,7 +9801,7 @@
             <a:fld id="{807CB568-C05F-482F-9F26-AA302B8892DF}" type="datetimeFigureOut">
               <a:rPr lang="es-ES" smtClean="0"/>
               <a:pPr/>
-              <a:t>24/04/2013</a:t>
+              <a:t>26/04/2013</a:t>
             </a:fld>
             <a:endParaRPr lang="es-ES"/>
           </a:p>
@@ -9958,7 +10052,7 @@
             <a:fld id="{807CB568-C05F-482F-9F26-AA302B8892DF}" type="datetimeFigureOut">
               <a:rPr lang="es-ES" smtClean="0"/>
               <a:pPr/>
-              <a:t>24/04/2013</a:t>
+              <a:t>26/04/2013</a:t>
             </a:fld>
             <a:endParaRPr lang="es-ES"/>
           </a:p>
@@ -24089,6 +24183,185 @@
 </p:sld>
 </file>
 
+<file path=ppt/slides/slide39.xml><?xml version="1.0" encoding="utf-8"?>
+<p:sld xmlns:a="http://schemas.openxmlformats.org/drawingml/2006/main" xmlns:r="http://schemas.openxmlformats.org/officeDocument/2006/relationships" xmlns:p="http://schemas.openxmlformats.org/presentationml/2006/main">
+  <p:cSld>
+    <p:spTree>
+      <p:nvGrpSpPr>
+        <p:cNvPr id="1" name=""/>
+        <p:cNvGrpSpPr/>
+        <p:nvPr/>
+      </p:nvGrpSpPr>
+      <p:grpSpPr>
+        <a:xfrm>
+          <a:off x="0" y="0"/>
+          <a:ext cx="0" cy="0"/>
+          <a:chOff x="0" y="0"/>
+          <a:chExt cx="0" cy="0"/>
+        </a:xfrm>
+      </p:grpSpPr>
+      <p:sp>
+        <p:nvSpPr>
+          <p:cNvPr id="3" name="2 Título"/>
+          <p:cNvSpPr>
+            <a:spLocks noGrp="1"/>
+          </p:cNvSpPr>
+          <p:nvPr>
+            <p:ph type="title"/>
+          </p:nvPr>
+        </p:nvSpPr>
+        <p:spPr>
+          <a:xfrm>
+            <a:off x="524338" y="216030"/>
+            <a:ext cx="8229600" cy="724942"/>
+          </a:xfrm>
+        </p:spPr>
+        <p:txBody>
+          <a:bodyPr/>
+          <a:lstStyle/>
+          <a:p>
+            <a:r>
+              <a:rPr lang="es-PE" dirty="0" smtClean="0">
+                <a:solidFill>
+                  <a:srgbClr val="00823B"/>
+                </a:solidFill>
+              </a:rPr>
+              <a:t>Información Adicional</a:t>
+            </a:r>
+            <a:endParaRPr lang="es-PE" dirty="0">
+              <a:solidFill>
+                <a:srgbClr val="00823B"/>
+              </a:solidFill>
+            </a:endParaRPr>
+          </a:p>
+        </p:txBody>
+      </p:sp>
+      <p:sp>
+        <p:nvSpPr>
+          <p:cNvPr id="13" name="12 CuadroTexto"/>
+          <p:cNvSpPr txBox="1"/>
+          <p:nvPr/>
+        </p:nvSpPr>
+        <p:spPr>
+          <a:xfrm>
+            <a:off x="209672" y="1124744"/>
+            <a:ext cx="8712968" cy="1938992"/>
+          </a:xfrm>
+          <a:prstGeom prst="rect">
+            <a:avLst/>
+          </a:prstGeom>
+          <a:noFill/>
+        </p:spPr>
+        <p:txBody>
+          <a:bodyPr wrap="square" rtlCol="0">
+            <a:spAutoFit/>
+          </a:bodyPr>
+          <a:lstStyle/>
+          <a:p>
+            <a:pPr marL="352425" indent="-352425">
+              <a:buFont typeface="Arial" pitchFamily="34" charset="0"/>
+              <a:buChar char="•"/>
+            </a:pPr>
+            <a:r>
+              <a:rPr lang="es-PE" sz="2400" dirty="0" smtClean="0"/>
+              <a:t>Probar Concurrencia: </a:t>
+            </a:r>
+            <a:r>
+              <a:rPr lang="es-PE" sz="2400" dirty="0" smtClean="0"/>
+              <a:t/>
+            </a:r>
+            <a:br>
+              <a:rPr lang="es-PE" sz="2400" dirty="0" smtClean="0"/>
+            </a:br>
+            <a:r>
+              <a:rPr lang="es-PE" sz="2400" dirty="0">
+                <a:solidFill>
+                  <a:srgbClr val="FFC000"/>
+                </a:solidFill>
+              </a:rPr>
+              <a:t>http://www.cs.rice.edu/~mgricken/research/concutest/concjunit</a:t>
+            </a:r>
+            <a:r>
+              <a:rPr lang="es-PE" sz="2400" dirty="0" smtClean="0">
+                <a:solidFill>
+                  <a:srgbClr val="FFC000"/>
+                </a:solidFill>
+              </a:rPr>
+              <a:t>/</a:t>
+            </a:r>
+            <a:br>
+              <a:rPr lang="es-PE" sz="2400" dirty="0" smtClean="0">
+                <a:solidFill>
+                  <a:srgbClr val="FFC000"/>
+                </a:solidFill>
+              </a:rPr>
+            </a:br>
+            <a:r>
+              <a:rPr lang="es-PE" sz="2400" dirty="0" smtClean="0">
+                <a:solidFill>
+                  <a:srgbClr val="FFC000"/>
+                </a:solidFill>
+              </a:rPr>
+              <a:t/>
+            </a:r>
+            <a:br>
+              <a:rPr lang="es-PE" sz="2400" dirty="0" smtClean="0">
+                <a:solidFill>
+                  <a:srgbClr val="FFC000"/>
+                </a:solidFill>
+              </a:rPr>
+            </a:br>
+            <a:r>
+              <a:rPr lang="es-PE" sz="2400" dirty="0" smtClean="0">
+                <a:solidFill>
+                  <a:srgbClr val="FFC000"/>
+                </a:solidFill>
+              </a:rPr>
+              <a:t>http</a:t>
+            </a:r>
+            <a:r>
+              <a:rPr lang="es-PE" sz="2400" dirty="0">
+                <a:solidFill>
+                  <a:srgbClr val="FFC000"/>
+                </a:solidFill>
+              </a:rPr>
+              <a:t>://java.dzone.com/articles/concurrent-junit-tests</a:t>
+            </a:r>
+            <a:endParaRPr lang="es-PE" sz="2400" dirty="0" smtClean="0">
+              <a:solidFill>
+                <a:srgbClr val="FFC000"/>
+              </a:solidFill>
+            </a:endParaRPr>
+          </a:p>
+          <a:p>
+            <a:pPr marL="352425" indent="-352425">
+              <a:buFont typeface="Arial" pitchFamily="34" charset="0"/>
+              <a:buChar char="•"/>
+            </a:pPr>
+            <a:endParaRPr lang="es-PE" sz="2400" dirty="0" smtClean="0"/>
+          </a:p>
+        </p:txBody>
+      </p:sp>
+    </p:spTree>
+    <p:extLst>
+      <p:ext uri="{BB962C8B-B14F-4D97-AF65-F5344CB8AC3E}">
+        <p14:creationId xmlns:p14="http://schemas.microsoft.com/office/powerpoint/2010/main" val="3784119034"/>
+      </p:ext>
+    </p:extLst>
+  </p:cSld>
+  <p:clrMapOvr>
+    <a:masterClrMapping/>
+  </p:clrMapOvr>
+  <p:timing>
+    <p:tnLst>
+      <p:par>
+        <p:cTn id="1" dur="indefinite" restart="never" nodeType="tmRoot"/>
+      </p:par>
+    </p:tnLst>
+  </p:timing>
+</p:sld>
+</file>
+
 <file path=ppt/slides/slide4.xml><?xml version="1.0" encoding="utf-8"?>
 <p:sld xmlns:a="http://schemas.openxmlformats.org/drawingml/2006/main" xmlns:r="http://schemas.openxmlformats.org/officeDocument/2006/relationships" xmlns:p="http://schemas.openxmlformats.org/presentationml/2006/main">
   <p:cSld>

</xml_diff>